<commit_message>
Update of the GUI
</commit_message>
<xml_diff>
--- a/gui/img/design/background.pptx
+++ b/gui/img/design/background.pptx
@@ -9,6 +9,8 @@
     <p:sldId id="261" r:id="rId3"/>
     <p:sldId id="257" r:id="rId4"/>
     <p:sldId id="259" r:id="rId5"/>
+    <p:sldId id="262" r:id="rId6"/>
+    <p:sldId id="263" r:id="rId7"/>
   </p:sldIdLst>
   <p:sldSz cx="9144000" cy="6858000" type="screen4x3"/>
   <p:notesSz cx="6858000" cy="9144000"/>
@@ -109,7 +111,7 @@
   </p:defaultTextStyle>
   <p:extLst>
     <p:ext uri="{EFAFB233-063F-42B5-8137-9DF3F51BA10A}">
-      <p15:sldGuideLst xmlns:p15="http://schemas.microsoft.com/office/powerpoint/2012/main">
+      <p15:sldGuideLst xmlns:p15="http://schemas.microsoft.com/office/powerpoint/2012/main" xmlns="">
         <p15:guide id="1" orient="horz" pos="2160">
           <p15:clr>
             <a:srgbClr val="A4A3A4"/>
@@ -307,7 +309,7 @@
           <a:p>
             <a:fld id="{C030460D-70E6-40A8-9934-EE0FBB3E5872}" type="datetimeFigureOut">
               <a:rPr lang="en-US" smtClean="0"/>
-              <a:t>6/18/2019</a:t>
+              <a:t>20-Jun-19</a:t>
             </a:fld>
             <a:endParaRPr lang="en-US"/>
           </a:p>
@@ -477,7 +479,7 @@
           <a:p>
             <a:fld id="{C030460D-70E6-40A8-9934-EE0FBB3E5872}" type="datetimeFigureOut">
               <a:rPr lang="en-US" smtClean="0"/>
-              <a:t>6/18/2019</a:t>
+              <a:t>20-Jun-19</a:t>
             </a:fld>
             <a:endParaRPr lang="en-US"/>
           </a:p>
@@ -657,7 +659,7 @@
           <a:p>
             <a:fld id="{C030460D-70E6-40A8-9934-EE0FBB3E5872}" type="datetimeFigureOut">
               <a:rPr lang="en-US" smtClean="0"/>
-              <a:t>6/18/2019</a:t>
+              <a:t>20-Jun-19</a:t>
             </a:fld>
             <a:endParaRPr lang="en-US"/>
           </a:p>
@@ -827,7 +829,7 @@
           <a:p>
             <a:fld id="{C030460D-70E6-40A8-9934-EE0FBB3E5872}" type="datetimeFigureOut">
               <a:rPr lang="en-US" smtClean="0"/>
-              <a:t>6/18/2019</a:t>
+              <a:t>20-Jun-19</a:t>
             </a:fld>
             <a:endParaRPr lang="en-US"/>
           </a:p>
@@ -1073,7 +1075,7 @@
           <a:p>
             <a:fld id="{C030460D-70E6-40A8-9934-EE0FBB3E5872}" type="datetimeFigureOut">
               <a:rPr lang="en-US" smtClean="0"/>
-              <a:t>6/18/2019</a:t>
+              <a:t>20-Jun-19</a:t>
             </a:fld>
             <a:endParaRPr lang="en-US"/>
           </a:p>
@@ -1361,7 +1363,7 @@
           <a:p>
             <a:fld id="{C030460D-70E6-40A8-9934-EE0FBB3E5872}" type="datetimeFigureOut">
               <a:rPr lang="en-US" smtClean="0"/>
-              <a:t>6/18/2019</a:t>
+              <a:t>20-Jun-19</a:t>
             </a:fld>
             <a:endParaRPr lang="en-US"/>
           </a:p>
@@ -1783,7 +1785,7 @@
           <a:p>
             <a:fld id="{C030460D-70E6-40A8-9934-EE0FBB3E5872}" type="datetimeFigureOut">
               <a:rPr lang="en-US" smtClean="0"/>
-              <a:t>6/18/2019</a:t>
+              <a:t>20-Jun-19</a:t>
             </a:fld>
             <a:endParaRPr lang="en-US"/>
           </a:p>
@@ -1901,7 +1903,7 @@
           <a:p>
             <a:fld id="{C030460D-70E6-40A8-9934-EE0FBB3E5872}" type="datetimeFigureOut">
               <a:rPr lang="en-US" smtClean="0"/>
-              <a:t>6/18/2019</a:t>
+              <a:t>20-Jun-19</a:t>
             </a:fld>
             <a:endParaRPr lang="en-US"/>
           </a:p>
@@ -1996,7 +1998,7 @@
           <a:p>
             <a:fld id="{C030460D-70E6-40A8-9934-EE0FBB3E5872}" type="datetimeFigureOut">
               <a:rPr lang="en-US" smtClean="0"/>
-              <a:t>6/18/2019</a:t>
+              <a:t>20-Jun-19</a:t>
             </a:fld>
             <a:endParaRPr lang="en-US"/>
           </a:p>
@@ -2273,7 +2275,7 @@
           <a:p>
             <a:fld id="{C030460D-70E6-40A8-9934-EE0FBB3E5872}" type="datetimeFigureOut">
               <a:rPr lang="en-US" smtClean="0"/>
-              <a:t>6/18/2019</a:t>
+              <a:t>20-Jun-19</a:t>
             </a:fld>
             <a:endParaRPr lang="en-US"/>
           </a:p>
@@ -2526,7 +2528,7 @@
           <a:p>
             <a:fld id="{C030460D-70E6-40A8-9934-EE0FBB3E5872}" type="datetimeFigureOut">
               <a:rPr lang="en-US" smtClean="0"/>
-              <a:t>6/18/2019</a:t>
+              <a:t>20-Jun-19</a:t>
             </a:fld>
             <a:endParaRPr lang="en-US"/>
           </a:p>
@@ -2739,7 +2741,7 @@
           <a:p>
             <a:fld id="{C030460D-70E6-40A8-9934-EE0FBB3E5872}" type="datetimeFigureOut">
               <a:rPr lang="en-US" smtClean="0"/>
-              <a:t>6/18/2019</a:t>
+              <a:t>20-Jun-19</a:t>
             </a:fld>
             <a:endParaRPr lang="en-US"/>
           </a:p>
@@ -5635,6 +5637,13 @@
   <p:clrMapOvr>
     <a:masterClrMapping/>
   </p:clrMapOvr>
+  <p:timing>
+    <p:tnLst>
+      <p:par>
+        <p:cTn id="1" dur="indefinite" restart="never" nodeType="tmRoot"/>
+      </p:par>
+    </p:tnLst>
+  </p:timing>
 </p:sld>
 </file>
 
@@ -5663,12 +5672,17 @@
         </p:nvSpPr>
         <p:spPr>
           <a:xfrm>
-            <a:off x="2438400" y="1371600"/>
-            <a:ext cx="2438400" cy="1447800"/>
+            <a:off x="1256923" y="647700"/>
+            <a:ext cx="1791077" cy="723900"/>
           </a:xfrm>
           <a:prstGeom prst="roundRect">
-            <a:avLst/>
-          </a:prstGeom>
+            <a:avLst>
+              <a:gd name="adj" fmla="val 0"/>
+            </a:avLst>
+          </a:prstGeom>
+          <a:ln w="3175">
+            <a:prstDash val="solid"/>
+          </a:ln>
         </p:spPr>
         <p:style>
           <a:lnRef idx="2">
@@ -5693,12 +5707,16 @@
             <a:pPr algn="ctr"/>
             <a:r>
               <a:rPr lang="fr-FR" sz="2000" b="1" dirty="0" smtClean="0">
-                <a:latin typeface="+mj-lt"/>
+                <a:latin typeface="Lato Light" panose="020F0502020204030203" pitchFamily="34" charset="0"/>
+                <a:ea typeface="Lato Light" panose="020F0502020204030203" pitchFamily="34" charset="0"/>
+                <a:cs typeface="Lato Light" panose="020F0502020204030203" pitchFamily="34" charset="0"/>
               </a:rPr>
               <a:t>MzConvert</a:t>
             </a:r>
             <a:endParaRPr lang="en-US" sz="2000" b="1" dirty="0">
-              <a:latin typeface="+mj-lt"/>
+              <a:latin typeface="Lato Light" panose="020F0502020204030203" pitchFamily="34" charset="0"/>
+              <a:ea typeface="Lato Light" panose="020F0502020204030203" pitchFamily="34" charset="0"/>
+              <a:cs typeface="Lato Light" panose="020F0502020204030203" pitchFamily="34" charset="0"/>
             </a:endParaRPr>
           </a:p>
         </p:txBody>
@@ -5822,6 +5840,110 @@
             <a:endParaRPr lang="en-US" dirty="0">
               <a:latin typeface="Arial Black" panose="020B0A04020102020204" pitchFamily="34" charset="0"/>
             </a:endParaRPr>
+          </a:p>
+        </p:txBody>
+      </p:sp>
+      <p:cxnSp>
+        <p:nvCxnSpPr>
+          <p:cNvPr id="9" name="Connecteur droit 8"/>
+          <p:cNvCxnSpPr/>
+          <p:nvPr/>
+        </p:nvCxnSpPr>
+        <p:spPr>
+          <a:xfrm>
+            <a:off x="1447800" y="1447800"/>
+            <a:ext cx="0" cy="762000"/>
+          </a:xfrm>
+          <a:prstGeom prst="line">
+            <a:avLst/>
+          </a:prstGeom>
+        </p:spPr>
+        <p:style>
+          <a:lnRef idx="1">
+            <a:schemeClr val="accent1"/>
+          </a:lnRef>
+          <a:fillRef idx="0">
+            <a:schemeClr val="accent1"/>
+          </a:fillRef>
+          <a:effectRef idx="0">
+            <a:schemeClr val="accent1"/>
+          </a:effectRef>
+          <a:fontRef idx="minor">
+            <a:schemeClr val="tx1"/>
+          </a:fontRef>
+        </p:style>
+      </p:cxnSp>
+      <p:sp>
+        <p:nvSpPr>
+          <p:cNvPr id="10" name="ZoneTexte 9"/>
+          <p:cNvSpPr txBox="1"/>
+          <p:nvPr/>
+        </p:nvSpPr>
+        <p:spPr>
+          <a:xfrm>
+            <a:off x="1676400" y="1981200"/>
+            <a:ext cx="2841227" cy="369332"/>
+          </a:xfrm>
+          <a:prstGeom prst="rect">
+            <a:avLst/>
+          </a:prstGeom>
+          <a:noFill/>
+        </p:spPr>
+        <p:txBody>
+          <a:bodyPr wrap="none" rtlCol="0">
+            <a:spAutoFit/>
+          </a:bodyPr>
+          <a:lstStyle/>
+          <a:p>
+            <a:r>
+              <a:rPr lang="fr-FR" dirty="0" err="1" smtClean="0"/>
+              <a:t>fjdlkhfkshfjkhdskjfhkdjshfkjh</a:t>
+            </a:r>
+            <a:endParaRPr lang="en-US" dirty="0"/>
+          </a:p>
+        </p:txBody>
+      </p:sp>
+      <p:sp>
+        <p:nvSpPr>
+          <p:cNvPr id="12" name="Rectangle à coins arrondis 11"/>
+          <p:cNvSpPr/>
+          <p:nvPr/>
+        </p:nvSpPr>
+        <p:spPr>
+          <a:xfrm>
+            <a:off x="6248400" y="1981200"/>
+            <a:ext cx="1143000" cy="685800"/>
+          </a:xfrm>
+          <a:prstGeom prst="roundRect">
+            <a:avLst/>
+          </a:prstGeom>
+        </p:spPr>
+        <p:style>
+          <a:lnRef idx="2">
+            <a:schemeClr val="accent5">
+              <a:shade val="50000"/>
+            </a:schemeClr>
+          </a:lnRef>
+          <a:fillRef idx="1">
+            <a:schemeClr val="accent5"/>
+          </a:fillRef>
+          <a:effectRef idx="0">
+            <a:schemeClr val="accent5"/>
+          </a:effectRef>
+          <a:fontRef idx="minor">
+            <a:schemeClr val="lt1"/>
+          </a:fontRef>
+        </p:style>
+        <p:txBody>
+          <a:bodyPr rtlCol="0" anchor="ctr"/>
+          <a:lstStyle/>
+          <a:p>
+            <a:pPr algn="ctr"/>
+            <a:r>
+              <a:rPr lang="fr-FR" dirty="0" smtClean="0"/>
+              <a:t>Action</a:t>
+            </a:r>
+            <a:endParaRPr lang="en-US" dirty="0"/>
           </a:p>
         </p:txBody>
       </p:sp>
@@ -5835,6 +5957,13 @@
   <p:clrMapOvr>
     <a:masterClrMapping/>
   </p:clrMapOvr>
+  <p:timing>
+    <p:tnLst>
+      <p:par>
+        <p:cTn id="1" dur="indefinite" restart="never" nodeType="tmRoot"/>
+      </p:par>
+    </p:tnLst>
+  </p:timing>
 </p:sld>
 </file>
 
@@ -6440,6 +6569,13 @@
   <p:clrMapOvr>
     <a:masterClrMapping/>
   </p:clrMapOvr>
+  <p:timing>
+    <p:tnLst>
+      <p:par>
+        <p:cTn id="1" dur="indefinite" restart="never" nodeType="tmRoot"/>
+      </p:par>
+    </p:tnLst>
+  </p:timing>
 </p:sld>
 </file>
 
@@ -7227,6 +7363,1668 @@
     <p:extLst>
       <p:ext uri="{BB962C8B-B14F-4D97-AF65-F5344CB8AC3E}">
         <p14:creationId xmlns:p14="http://schemas.microsoft.com/office/powerpoint/2010/main" val="2611293986"/>
+      </p:ext>
+    </p:extLst>
+  </p:cSld>
+  <p:clrMapOvr>
+    <a:masterClrMapping/>
+  </p:clrMapOvr>
+</p:sld>
+</file>
+
+<file path=ppt/slides/slide5.xml><?xml version="1.0" encoding="utf-8"?>
+<p:sld xmlns:a="http://schemas.openxmlformats.org/drawingml/2006/main" xmlns:r="http://schemas.openxmlformats.org/officeDocument/2006/relationships" xmlns:p="http://schemas.openxmlformats.org/presentationml/2006/main">
+  <p:cSld>
+    <p:spTree>
+      <p:nvGrpSpPr>
+        <p:cNvPr id="1" name=""/>
+        <p:cNvGrpSpPr/>
+        <p:nvPr/>
+      </p:nvGrpSpPr>
+      <p:grpSpPr>
+        <a:xfrm>
+          <a:off x="0" y="0"/>
+          <a:ext cx="0" cy="0"/>
+          <a:chOff x="0" y="0"/>
+          <a:chExt cx="0" cy="0"/>
+        </a:xfrm>
+      </p:grpSpPr>
+      <p:sp>
+        <p:nvSpPr>
+          <p:cNvPr id="4" name="Rectangle à coins arrondis 3"/>
+          <p:cNvSpPr/>
+          <p:nvPr/>
+        </p:nvSpPr>
+        <p:spPr>
+          <a:xfrm>
+            <a:off x="395489" y="50569"/>
+            <a:ext cx="1169113" cy="457200"/>
+          </a:xfrm>
+          <a:prstGeom prst="roundRect">
+            <a:avLst/>
+          </a:prstGeom>
+        </p:spPr>
+        <p:style>
+          <a:lnRef idx="2">
+            <a:schemeClr val="accent5">
+              <a:shade val="50000"/>
+            </a:schemeClr>
+          </a:lnRef>
+          <a:fillRef idx="1">
+            <a:schemeClr val="accent5"/>
+          </a:fillRef>
+          <a:effectRef idx="0">
+            <a:schemeClr val="accent5"/>
+          </a:effectRef>
+          <a:fontRef idx="minor">
+            <a:schemeClr val="lt1"/>
+          </a:fontRef>
+        </p:style>
+        <p:txBody>
+          <a:bodyPr rtlCol="0" anchor="ctr"/>
+          <a:lstStyle/>
+          <a:p>
+            <a:pPr algn="ctr"/>
+            <a:r>
+              <a:rPr lang="fr-FR" sz="1200" b="1" dirty="0" err="1" smtClean="0"/>
+              <a:t>ProteoWizard</a:t>
+            </a:r>
+            <a:endParaRPr lang="en-US" sz="1600" b="1" dirty="0"/>
+          </a:p>
+        </p:txBody>
+      </p:sp>
+      <p:sp>
+        <p:nvSpPr>
+          <p:cNvPr id="5" name="Rectangle à coins arrondis 4"/>
+          <p:cNvSpPr/>
+          <p:nvPr/>
+        </p:nvSpPr>
+        <p:spPr>
+          <a:xfrm>
+            <a:off x="108164" y="895965"/>
+            <a:ext cx="6292795" cy="2456836"/>
+          </a:xfrm>
+          <a:prstGeom prst="roundRect">
+            <a:avLst/>
+          </a:prstGeom>
+        </p:spPr>
+        <p:style>
+          <a:lnRef idx="2">
+            <a:schemeClr val="accent6">
+              <a:shade val="50000"/>
+            </a:schemeClr>
+          </a:lnRef>
+          <a:fillRef idx="1">
+            <a:schemeClr val="accent6"/>
+          </a:fillRef>
+          <a:effectRef idx="0">
+            <a:schemeClr val="accent6"/>
+          </a:effectRef>
+          <a:fontRef idx="minor">
+            <a:schemeClr val="lt1"/>
+          </a:fontRef>
+        </p:style>
+        <p:txBody>
+          <a:bodyPr rtlCol="0" anchor="ctr"/>
+          <a:lstStyle/>
+          <a:p>
+            <a:pPr algn="ctr"/>
+            <a:endParaRPr lang="en-US" sz="1000" b="1"/>
+          </a:p>
+        </p:txBody>
+      </p:sp>
+      <p:sp>
+        <p:nvSpPr>
+          <p:cNvPr id="6" name="Rectangle à coins arrondis 5"/>
+          <p:cNvSpPr/>
+          <p:nvPr/>
+        </p:nvSpPr>
+        <p:spPr>
+          <a:xfrm>
+            <a:off x="228760" y="1341181"/>
+            <a:ext cx="3393808" cy="664190"/>
+          </a:xfrm>
+          <a:prstGeom prst="roundRect">
+            <a:avLst/>
+          </a:prstGeom>
+        </p:spPr>
+        <p:style>
+          <a:lnRef idx="2">
+            <a:schemeClr val="accent6">
+              <a:shade val="50000"/>
+            </a:schemeClr>
+          </a:lnRef>
+          <a:fillRef idx="1">
+            <a:schemeClr val="accent6"/>
+          </a:fillRef>
+          <a:effectRef idx="0">
+            <a:schemeClr val="accent6"/>
+          </a:effectRef>
+          <a:fontRef idx="minor">
+            <a:schemeClr val="lt1"/>
+          </a:fontRef>
+        </p:style>
+        <p:txBody>
+          <a:bodyPr rtlCol="0" anchor="ctr"/>
+          <a:lstStyle/>
+          <a:p>
+            <a:pPr algn="ctr"/>
+            <a:endParaRPr lang="en-US" sz="1000" b="1"/>
+          </a:p>
+        </p:txBody>
+      </p:sp>
+      <p:sp>
+        <p:nvSpPr>
+          <p:cNvPr id="7" name="Rectangle à coins arrondis 6"/>
+          <p:cNvSpPr/>
+          <p:nvPr/>
+        </p:nvSpPr>
+        <p:spPr>
+          <a:xfrm>
+            <a:off x="228760" y="2516493"/>
+            <a:ext cx="6059006" cy="760108"/>
+          </a:xfrm>
+          <a:prstGeom prst="roundRect">
+            <a:avLst/>
+          </a:prstGeom>
+        </p:spPr>
+        <p:style>
+          <a:lnRef idx="2">
+            <a:schemeClr val="accent6">
+              <a:shade val="50000"/>
+            </a:schemeClr>
+          </a:lnRef>
+          <a:fillRef idx="1">
+            <a:schemeClr val="accent6"/>
+          </a:fillRef>
+          <a:effectRef idx="0">
+            <a:schemeClr val="accent6"/>
+          </a:effectRef>
+          <a:fontRef idx="minor">
+            <a:schemeClr val="lt1"/>
+          </a:fontRef>
+        </p:style>
+        <p:txBody>
+          <a:bodyPr rtlCol="0" anchor="ctr"/>
+          <a:lstStyle/>
+          <a:p>
+            <a:pPr algn="ctr"/>
+            <a:endParaRPr lang="en-US" sz="1000" b="1"/>
+          </a:p>
+        </p:txBody>
+      </p:sp>
+      <p:sp>
+        <p:nvSpPr>
+          <p:cNvPr id="8" name="Rectangle à coins arrondis 7"/>
+          <p:cNvSpPr/>
+          <p:nvPr/>
+        </p:nvSpPr>
+        <p:spPr>
+          <a:xfrm>
+            <a:off x="255256" y="1487478"/>
+            <a:ext cx="1642596" cy="441693"/>
+          </a:xfrm>
+          <a:prstGeom prst="roundRect">
+            <a:avLst/>
+          </a:prstGeom>
+        </p:spPr>
+        <p:style>
+          <a:lnRef idx="1">
+            <a:schemeClr val="accent6"/>
+          </a:lnRef>
+          <a:fillRef idx="2">
+            <a:schemeClr val="accent6"/>
+          </a:fillRef>
+          <a:effectRef idx="1">
+            <a:schemeClr val="accent6"/>
+          </a:effectRef>
+          <a:fontRef idx="minor">
+            <a:schemeClr val="dk1"/>
+          </a:fontRef>
+        </p:style>
+        <p:txBody>
+          <a:bodyPr rtlCol="0" anchor="ctr"/>
+          <a:lstStyle/>
+          <a:p>
+            <a:pPr algn="ctr"/>
+            <a:r>
+              <a:rPr lang="fr-FR" sz="900" b="1" dirty="0" err="1" smtClean="0"/>
+              <a:t>FeatureFinderMetabo</a:t>
+            </a:r>
+            <a:endParaRPr lang="en-US" sz="900" b="1" dirty="0"/>
+          </a:p>
+        </p:txBody>
+      </p:sp>
+      <p:sp>
+        <p:nvSpPr>
+          <p:cNvPr id="9" name="Rectangle à coins arrondis 8"/>
+          <p:cNvSpPr/>
+          <p:nvPr/>
+        </p:nvSpPr>
+        <p:spPr>
+          <a:xfrm>
+            <a:off x="2361116" y="1475414"/>
+            <a:ext cx="1123018" cy="453758"/>
+          </a:xfrm>
+          <a:prstGeom prst="roundRect">
+            <a:avLst/>
+          </a:prstGeom>
+        </p:spPr>
+        <p:style>
+          <a:lnRef idx="1">
+            <a:schemeClr val="accent6"/>
+          </a:lnRef>
+          <a:fillRef idx="2">
+            <a:schemeClr val="accent6"/>
+          </a:fillRef>
+          <a:effectRef idx="1">
+            <a:schemeClr val="accent6"/>
+          </a:effectRef>
+          <a:fontRef idx="minor">
+            <a:schemeClr val="dk1"/>
+          </a:fontRef>
+        </p:style>
+        <p:txBody>
+          <a:bodyPr rtlCol="0" anchor="ctr"/>
+          <a:lstStyle/>
+          <a:p>
+            <a:pPr algn="ctr"/>
+            <a:r>
+              <a:rPr lang="fr-FR" sz="900" b="1" dirty="0" err="1" smtClean="0"/>
+              <a:t>FileFilter</a:t>
+            </a:r>
+            <a:endParaRPr lang="en-US" sz="900" b="1" dirty="0"/>
+          </a:p>
+        </p:txBody>
+      </p:sp>
+      <p:sp>
+        <p:nvSpPr>
+          <p:cNvPr id="10" name="Rectangle à coins arrondis 9"/>
+          <p:cNvSpPr/>
+          <p:nvPr/>
+        </p:nvSpPr>
+        <p:spPr>
+          <a:xfrm>
+            <a:off x="312263" y="2702208"/>
+            <a:ext cx="1542665" cy="421992"/>
+          </a:xfrm>
+          <a:prstGeom prst="roundRect">
+            <a:avLst/>
+          </a:prstGeom>
+        </p:spPr>
+        <p:style>
+          <a:lnRef idx="1">
+            <a:schemeClr val="accent6"/>
+          </a:lnRef>
+          <a:fillRef idx="2">
+            <a:schemeClr val="accent6"/>
+          </a:fillRef>
+          <a:effectRef idx="1">
+            <a:schemeClr val="accent6"/>
+          </a:effectRef>
+          <a:fontRef idx="minor">
+            <a:schemeClr val="dk1"/>
+          </a:fontRef>
+        </p:style>
+        <p:txBody>
+          <a:bodyPr rtlCol="0" anchor="ctr"/>
+          <a:lstStyle/>
+          <a:p>
+            <a:pPr algn="ctr"/>
+            <a:r>
+              <a:rPr lang="fr-FR" sz="900" b="1" dirty="0" err="1" smtClean="0"/>
+              <a:t>MapAlignerPoseClustering</a:t>
+            </a:r>
+            <a:endParaRPr lang="fr-FR" sz="900" b="1" dirty="0" smtClean="0"/>
+          </a:p>
+          <a:p>
+            <a:pPr algn="ctr"/>
+            <a:endParaRPr lang="en-US" sz="900" b="1" dirty="0"/>
+          </a:p>
+        </p:txBody>
+      </p:sp>
+      <p:sp>
+        <p:nvSpPr>
+          <p:cNvPr id="11" name="Rectangle à coins arrondis 10"/>
+          <p:cNvSpPr/>
+          <p:nvPr/>
+        </p:nvSpPr>
+        <p:spPr>
+          <a:xfrm>
+            <a:off x="2702577" y="2702208"/>
+            <a:ext cx="1595323" cy="347562"/>
+          </a:xfrm>
+          <a:prstGeom prst="roundRect">
+            <a:avLst/>
+          </a:prstGeom>
+        </p:spPr>
+        <p:style>
+          <a:lnRef idx="1">
+            <a:schemeClr val="accent6"/>
+          </a:lnRef>
+          <a:fillRef idx="2">
+            <a:schemeClr val="accent6"/>
+          </a:fillRef>
+          <a:effectRef idx="1">
+            <a:schemeClr val="accent6"/>
+          </a:effectRef>
+          <a:fontRef idx="minor">
+            <a:schemeClr val="dk1"/>
+          </a:fontRef>
+        </p:style>
+        <p:txBody>
+          <a:bodyPr rtlCol="0" anchor="ctr"/>
+          <a:lstStyle/>
+          <a:p>
+            <a:pPr algn="ctr"/>
+            <a:r>
+              <a:rPr lang="fr-FR" sz="900" b="1" dirty="0" err="1" smtClean="0"/>
+              <a:t>FeatureLinkerUnlabeledQT</a:t>
+            </a:r>
+            <a:endParaRPr lang="en-US" sz="900" b="1" dirty="0"/>
+          </a:p>
+        </p:txBody>
+      </p:sp>
+      <p:sp>
+        <p:nvSpPr>
+          <p:cNvPr id="12" name="Rectangle à coins arrondis 11"/>
+          <p:cNvSpPr/>
+          <p:nvPr/>
+        </p:nvSpPr>
+        <p:spPr>
+          <a:xfrm>
+            <a:off x="5104788" y="2679323"/>
+            <a:ext cx="1143877" cy="444877"/>
+          </a:xfrm>
+          <a:prstGeom prst="roundRect">
+            <a:avLst/>
+          </a:prstGeom>
+        </p:spPr>
+        <p:style>
+          <a:lnRef idx="1">
+            <a:schemeClr val="accent6"/>
+          </a:lnRef>
+          <a:fillRef idx="2">
+            <a:schemeClr val="accent6"/>
+          </a:fillRef>
+          <a:effectRef idx="1">
+            <a:schemeClr val="accent6"/>
+          </a:effectRef>
+          <a:fontRef idx="minor">
+            <a:schemeClr val="dk1"/>
+          </a:fontRef>
+        </p:style>
+        <p:txBody>
+          <a:bodyPr rtlCol="0" anchor="ctr"/>
+          <a:lstStyle/>
+          <a:p>
+            <a:pPr algn="ctr"/>
+            <a:r>
+              <a:rPr lang="fr-FR" sz="900" b="1" dirty="0" err="1" smtClean="0"/>
+              <a:t>MinConsensusSize</a:t>
+            </a:r>
+            <a:endParaRPr lang="en-US" sz="900" b="1" dirty="0"/>
+          </a:p>
+        </p:txBody>
+      </p:sp>
+      <p:sp>
+        <p:nvSpPr>
+          <p:cNvPr id="13" name="ZoneTexte 12"/>
+          <p:cNvSpPr txBox="1"/>
+          <p:nvPr/>
+        </p:nvSpPr>
+        <p:spPr>
+          <a:xfrm>
+            <a:off x="536062" y="588187"/>
+            <a:ext cx="1010614" cy="261610"/>
+          </a:xfrm>
+          <a:prstGeom prst="rect">
+            <a:avLst/>
+          </a:prstGeom>
+          <a:noFill/>
+        </p:spPr>
+        <p:txBody>
+          <a:bodyPr wrap="square" rtlCol="0">
+            <a:spAutoFit/>
+          </a:bodyPr>
+          <a:lstStyle/>
+          <a:p>
+            <a:r>
+              <a:rPr lang="fr-FR" sz="1100" b="1" dirty="0" smtClean="0"/>
+              <a:t>OpenMS</a:t>
+            </a:r>
+            <a:endParaRPr lang="en-US" sz="1100" b="1" dirty="0"/>
+          </a:p>
+        </p:txBody>
+      </p:sp>
+      <p:sp>
+        <p:nvSpPr>
+          <p:cNvPr id="14" name="ZoneTexte 13"/>
+          <p:cNvSpPr txBox="1"/>
+          <p:nvPr/>
+        </p:nvSpPr>
+        <p:spPr>
+          <a:xfrm>
+            <a:off x="592426" y="946686"/>
+            <a:ext cx="2103355" cy="261610"/>
+          </a:xfrm>
+          <a:prstGeom prst="rect">
+            <a:avLst/>
+          </a:prstGeom>
+          <a:noFill/>
+        </p:spPr>
+        <p:txBody>
+          <a:bodyPr wrap="square" rtlCol="0">
+            <a:spAutoFit/>
+          </a:bodyPr>
+          <a:lstStyle/>
+          <a:p>
+            <a:r>
+              <a:rPr lang="fr-FR" sz="1100" b="1" dirty="0" err="1" smtClean="0">
+                <a:solidFill>
+                  <a:schemeClr val="bg1"/>
+                </a:solidFill>
+              </a:rPr>
+              <a:t>FeatureExtraction</a:t>
+            </a:r>
+            <a:endParaRPr lang="en-US" sz="1000" b="1" dirty="0">
+              <a:solidFill>
+                <a:schemeClr val="bg1"/>
+              </a:solidFill>
+            </a:endParaRPr>
+          </a:p>
+        </p:txBody>
+      </p:sp>
+      <p:sp>
+        <p:nvSpPr>
+          <p:cNvPr id="15" name="ZoneTexte 14"/>
+          <p:cNvSpPr txBox="1"/>
+          <p:nvPr/>
+        </p:nvSpPr>
+        <p:spPr>
+          <a:xfrm>
+            <a:off x="479284" y="2214577"/>
+            <a:ext cx="1802205" cy="261610"/>
+          </a:xfrm>
+          <a:prstGeom prst="rect">
+            <a:avLst/>
+          </a:prstGeom>
+          <a:noFill/>
+        </p:spPr>
+        <p:txBody>
+          <a:bodyPr wrap="square" rtlCol="0">
+            <a:spAutoFit/>
+          </a:bodyPr>
+          <a:lstStyle/>
+          <a:p>
+            <a:r>
+              <a:rPr lang="fr-FR" sz="1100" b="1" dirty="0" err="1" smtClean="0">
+                <a:solidFill>
+                  <a:schemeClr val="bg1"/>
+                </a:solidFill>
+              </a:rPr>
+              <a:t>FeatureLinking</a:t>
+            </a:r>
+            <a:endParaRPr lang="en-US" sz="1000" b="1" dirty="0">
+              <a:solidFill>
+                <a:schemeClr val="bg1"/>
+              </a:solidFill>
+            </a:endParaRPr>
+          </a:p>
+        </p:txBody>
+      </p:sp>
+      <p:cxnSp>
+        <p:nvCxnSpPr>
+          <p:cNvPr id="16" name="Connecteur droit avec flèche 15"/>
+          <p:cNvCxnSpPr/>
+          <p:nvPr/>
+        </p:nvCxnSpPr>
+        <p:spPr>
+          <a:xfrm>
+            <a:off x="1983033" y="3005365"/>
+            <a:ext cx="442178" cy="0"/>
+          </a:xfrm>
+          <a:prstGeom prst="straightConnector1">
+            <a:avLst/>
+          </a:prstGeom>
+          <a:ln>
+            <a:tailEnd type="arrow"/>
+          </a:ln>
+        </p:spPr>
+        <p:style>
+          <a:lnRef idx="2">
+            <a:schemeClr val="accent1"/>
+          </a:lnRef>
+          <a:fillRef idx="0">
+            <a:schemeClr val="accent1"/>
+          </a:fillRef>
+          <a:effectRef idx="1">
+            <a:schemeClr val="accent1"/>
+          </a:effectRef>
+          <a:fontRef idx="minor">
+            <a:schemeClr val="tx1"/>
+          </a:fontRef>
+        </p:style>
+      </p:cxnSp>
+      <p:cxnSp>
+        <p:nvCxnSpPr>
+          <p:cNvPr id="17" name="Connecteur droit avec flèche 16"/>
+          <p:cNvCxnSpPr/>
+          <p:nvPr/>
+        </p:nvCxnSpPr>
+        <p:spPr>
+          <a:xfrm>
+            <a:off x="1979331" y="1708324"/>
+            <a:ext cx="334626" cy="0"/>
+          </a:xfrm>
+          <a:prstGeom prst="straightConnector1">
+            <a:avLst/>
+          </a:prstGeom>
+          <a:ln>
+            <a:tailEnd type="arrow"/>
+          </a:ln>
+        </p:spPr>
+        <p:style>
+          <a:lnRef idx="2">
+            <a:schemeClr val="accent1"/>
+          </a:lnRef>
+          <a:fillRef idx="0">
+            <a:schemeClr val="accent1"/>
+          </a:fillRef>
+          <a:effectRef idx="1">
+            <a:schemeClr val="accent1"/>
+          </a:effectRef>
+          <a:fontRef idx="minor">
+            <a:schemeClr val="tx1"/>
+          </a:fontRef>
+        </p:style>
+      </p:cxnSp>
+      <p:cxnSp>
+        <p:nvCxnSpPr>
+          <p:cNvPr id="18" name="Connecteur droit avec flèche 17"/>
+          <p:cNvCxnSpPr/>
+          <p:nvPr/>
+        </p:nvCxnSpPr>
+        <p:spPr>
+          <a:xfrm>
+            <a:off x="4546035" y="3049770"/>
+            <a:ext cx="281387" cy="0"/>
+          </a:xfrm>
+          <a:prstGeom prst="straightConnector1">
+            <a:avLst/>
+          </a:prstGeom>
+          <a:ln>
+            <a:tailEnd type="arrow"/>
+          </a:ln>
+        </p:spPr>
+        <p:style>
+          <a:lnRef idx="2">
+            <a:schemeClr val="accent1"/>
+          </a:lnRef>
+          <a:fillRef idx="0">
+            <a:schemeClr val="accent1"/>
+          </a:fillRef>
+          <a:effectRef idx="1">
+            <a:schemeClr val="accent1"/>
+          </a:effectRef>
+          <a:fontRef idx="minor">
+            <a:schemeClr val="tx1"/>
+          </a:fontRef>
+        </p:style>
+      </p:cxnSp>
+      <p:sp>
+        <p:nvSpPr>
+          <p:cNvPr id="28" name="Rectangle à coins arrondis 27"/>
+          <p:cNvSpPr/>
+          <p:nvPr/>
+        </p:nvSpPr>
+        <p:spPr>
+          <a:xfrm>
+            <a:off x="1642648" y="50569"/>
+            <a:ext cx="1131413" cy="457200"/>
+          </a:xfrm>
+          <a:prstGeom prst="roundRect">
+            <a:avLst/>
+          </a:prstGeom>
+        </p:spPr>
+        <p:style>
+          <a:lnRef idx="2">
+            <a:schemeClr val="accent1">
+              <a:shade val="50000"/>
+            </a:schemeClr>
+          </a:lnRef>
+          <a:fillRef idx="1">
+            <a:schemeClr val="accent1"/>
+          </a:fillRef>
+          <a:effectRef idx="0">
+            <a:schemeClr val="accent1"/>
+          </a:effectRef>
+          <a:fontRef idx="minor">
+            <a:schemeClr val="lt1"/>
+          </a:fontRef>
+        </p:style>
+        <p:txBody>
+          <a:bodyPr rtlCol="0" anchor="ctr"/>
+          <a:lstStyle/>
+          <a:p>
+            <a:pPr algn="ctr"/>
+            <a:r>
+              <a:rPr lang="fr-FR" sz="1400" dirty="0" err="1" smtClean="0"/>
+              <a:t>PushButton</a:t>
+            </a:r>
+            <a:endParaRPr lang="en-US" sz="1400" dirty="0"/>
+          </a:p>
+        </p:txBody>
+      </p:sp>
+      <p:sp>
+        <p:nvSpPr>
+          <p:cNvPr id="31" name="Rectangle à coins arrondis 30"/>
+          <p:cNvSpPr/>
+          <p:nvPr/>
+        </p:nvSpPr>
+        <p:spPr>
+          <a:xfrm>
+            <a:off x="645709" y="946686"/>
+            <a:ext cx="1131413" cy="261610"/>
+          </a:xfrm>
+          <a:prstGeom prst="roundRect">
+            <a:avLst/>
+          </a:prstGeom>
+        </p:spPr>
+        <p:style>
+          <a:lnRef idx="2">
+            <a:schemeClr val="accent1">
+              <a:shade val="50000"/>
+            </a:schemeClr>
+          </a:lnRef>
+          <a:fillRef idx="1">
+            <a:schemeClr val="accent1"/>
+          </a:fillRef>
+          <a:effectRef idx="0">
+            <a:schemeClr val="accent1"/>
+          </a:effectRef>
+          <a:fontRef idx="minor">
+            <a:schemeClr val="lt1"/>
+          </a:fontRef>
+        </p:style>
+        <p:txBody>
+          <a:bodyPr rtlCol="0" anchor="ctr"/>
+          <a:lstStyle/>
+          <a:p>
+            <a:pPr algn="ctr"/>
+            <a:r>
+              <a:rPr lang="fr-FR" sz="1400" dirty="0" err="1" smtClean="0"/>
+              <a:t>PushButton</a:t>
+            </a:r>
+            <a:endParaRPr lang="en-US" sz="1400" dirty="0"/>
+          </a:p>
+        </p:txBody>
+      </p:sp>
+      <p:sp>
+        <p:nvSpPr>
+          <p:cNvPr id="32" name="Rectangle à coins arrondis 31"/>
+          <p:cNvSpPr/>
+          <p:nvPr/>
+        </p:nvSpPr>
+        <p:spPr>
+          <a:xfrm>
+            <a:off x="521410" y="2119962"/>
+            <a:ext cx="1131413" cy="261610"/>
+          </a:xfrm>
+          <a:prstGeom prst="roundRect">
+            <a:avLst/>
+          </a:prstGeom>
+        </p:spPr>
+        <p:style>
+          <a:lnRef idx="2">
+            <a:schemeClr val="accent1">
+              <a:shade val="50000"/>
+            </a:schemeClr>
+          </a:lnRef>
+          <a:fillRef idx="1">
+            <a:schemeClr val="accent1"/>
+          </a:fillRef>
+          <a:effectRef idx="0">
+            <a:schemeClr val="accent1"/>
+          </a:effectRef>
+          <a:fontRef idx="minor">
+            <a:schemeClr val="lt1"/>
+          </a:fontRef>
+        </p:style>
+        <p:txBody>
+          <a:bodyPr rtlCol="0" anchor="ctr"/>
+          <a:lstStyle/>
+          <a:p>
+            <a:pPr algn="ctr"/>
+            <a:r>
+              <a:rPr lang="fr-FR" sz="1400" dirty="0" err="1" smtClean="0"/>
+              <a:t>PushButton</a:t>
+            </a:r>
+            <a:endParaRPr lang="en-US" sz="1400" dirty="0"/>
+          </a:p>
+        </p:txBody>
+      </p:sp>
+      <p:sp>
+        <p:nvSpPr>
+          <p:cNvPr id="33" name="Rectangle à coins arrondis 32"/>
+          <p:cNvSpPr/>
+          <p:nvPr/>
+        </p:nvSpPr>
+        <p:spPr>
+          <a:xfrm>
+            <a:off x="108453" y="3706934"/>
+            <a:ext cx="8457840" cy="1929134"/>
+          </a:xfrm>
+          <a:prstGeom prst="roundRect">
+            <a:avLst/>
+          </a:prstGeom>
+          <a:solidFill>
+            <a:schemeClr val="accent2"/>
+          </a:solidFill>
+        </p:spPr>
+        <p:style>
+          <a:lnRef idx="2">
+            <a:schemeClr val="accent2">
+              <a:shade val="50000"/>
+            </a:schemeClr>
+          </a:lnRef>
+          <a:fillRef idx="1">
+            <a:schemeClr val="accent2"/>
+          </a:fillRef>
+          <a:effectRef idx="0">
+            <a:schemeClr val="accent2"/>
+          </a:effectRef>
+          <a:fontRef idx="minor">
+            <a:schemeClr val="lt1"/>
+          </a:fontRef>
+        </p:style>
+        <p:txBody>
+          <a:bodyPr rtlCol="0" anchor="ctr"/>
+          <a:lstStyle/>
+          <a:p>
+            <a:pPr algn="ctr"/>
+            <a:endParaRPr lang="en-US" sz="1050" b="1"/>
+          </a:p>
+        </p:txBody>
+      </p:sp>
+      <p:sp>
+        <p:nvSpPr>
+          <p:cNvPr id="34" name="Rectangle à coins arrondis 33"/>
+          <p:cNvSpPr/>
+          <p:nvPr/>
+        </p:nvSpPr>
+        <p:spPr>
+          <a:xfrm>
+            <a:off x="258472" y="3898534"/>
+            <a:ext cx="889801" cy="515943"/>
+          </a:xfrm>
+          <a:prstGeom prst="roundRect">
+            <a:avLst/>
+          </a:prstGeom>
+        </p:spPr>
+        <p:style>
+          <a:lnRef idx="1">
+            <a:schemeClr val="accent2"/>
+          </a:lnRef>
+          <a:fillRef idx="2">
+            <a:schemeClr val="accent2"/>
+          </a:fillRef>
+          <a:effectRef idx="1">
+            <a:schemeClr val="accent2"/>
+          </a:effectRef>
+          <a:fontRef idx="minor">
+            <a:schemeClr val="dk1"/>
+          </a:fontRef>
+        </p:style>
+        <p:txBody>
+          <a:bodyPr rtlCol="0" anchor="ctr"/>
+          <a:lstStyle/>
+          <a:p>
+            <a:pPr algn="ctr"/>
+            <a:r>
+              <a:rPr lang="fr-FR" sz="1000" b="1" dirty="0" err="1" smtClean="0"/>
+              <a:t>MetaData</a:t>
+            </a:r>
+            <a:endParaRPr lang="en-US" sz="1000" b="1" dirty="0"/>
+          </a:p>
+        </p:txBody>
+      </p:sp>
+      <p:sp>
+        <p:nvSpPr>
+          <p:cNvPr id="35" name="Rectangle à coins arrondis 34"/>
+          <p:cNvSpPr/>
+          <p:nvPr/>
+        </p:nvSpPr>
+        <p:spPr>
+          <a:xfrm>
+            <a:off x="1728262" y="3898539"/>
+            <a:ext cx="932711" cy="515943"/>
+          </a:xfrm>
+          <a:prstGeom prst="roundRect">
+            <a:avLst/>
+          </a:prstGeom>
+        </p:spPr>
+        <p:style>
+          <a:lnRef idx="1">
+            <a:schemeClr val="accent2"/>
+          </a:lnRef>
+          <a:fillRef idx="2">
+            <a:schemeClr val="accent2"/>
+          </a:fillRef>
+          <a:effectRef idx="1">
+            <a:schemeClr val="accent2"/>
+          </a:effectRef>
+          <a:fontRef idx="minor">
+            <a:schemeClr val="dk1"/>
+          </a:fontRef>
+        </p:style>
+        <p:txBody>
+          <a:bodyPr rtlCol="0" anchor="ctr"/>
+          <a:lstStyle/>
+          <a:p>
+            <a:pPr algn="ctr"/>
+            <a:r>
+              <a:rPr lang="fr-FR" sz="1000" b="1" dirty="0" err="1" smtClean="0"/>
+              <a:t>ConsensusAnnotator</a:t>
+            </a:r>
+            <a:endParaRPr lang="en-US" sz="1000" b="1" dirty="0"/>
+          </a:p>
+        </p:txBody>
+      </p:sp>
+      <p:sp>
+        <p:nvSpPr>
+          <p:cNvPr id="36" name="Rectangle à coins arrondis 35"/>
+          <p:cNvSpPr/>
+          <p:nvPr/>
+        </p:nvSpPr>
+        <p:spPr>
+          <a:xfrm>
+            <a:off x="3398356" y="3945615"/>
+            <a:ext cx="1123655" cy="468867"/>
+          </a:xfrm>
+          <a:prstGeom prst="roundRect">
+            <a:avLst/>
+          </a:prstGeom>
+        </p:spPr>
+        <p:style>
+          <a:lnRef idx="1">
+            <a:schemeClr val="accent2"/>
+          </a:lnRef>
+          <a:fillRef idx="2">
+            <a:schemeClr val="accent2"/>
+          </a:fillRef>
+          <a:effectRef idx="1">
+            <a:schemeClr val="accent2"/>
+          </a:effectRef>
+          <a:fontRef idx="minor">
+            <a:schemeClr val="dk1"/>
+          </a:fontRef>
+        </p:style>
+        <p:txBody>
+          <a:bodyPr rtlCol="0" anchor="ctr"/>
+          <a:lstStyle/>
+          <a:p>
+            <a:pPr algn="ctr"/>
+            <a:r>
+              <a:rPr lang="fr-FR" sz="1000" b="1" dirty="0" err="1" smtClean="0"/>
+              <a:t>DataSelector</a:t>
+            </a:r>
+            <a:endParaRPr lang="fr-FR" sz="1000" b="1" dirty="0" smtClean="0"/>
+          </a:p>
+          <a:p>
+            <a:pPr algn="ctr"/>
+            <a:endParaRPr lang="en-US" sz="1000" b="1" dirty="0"/>
+          </a:p>
+        </p:txBody>
+      </p:sp>
+      <p:sp>
+        <p:nvSpPr>
+          <p:cNvPr id="37" name="Rectangle à coins arrondis 36"/>
+          <p:cNvSpPr/>
+          <p:nvPr/>
+        </p:nvSpPr>
+        <p:spPr>
+          <a:xfrm>
+            <a:off x="5412984" y="3876555"/>
+            <a:ext cx="963951" cy="515943"/>
+          </a:xfrm>
+          <a:prstGeom prst="roundRect">
+            <a:avLst/>
+          </a:prstGeom>
+        </p:spPr>
+        <p:style>
+          <a:lnRef idx="1">
+            <a:schemeClr val="accent2"/>
+          </a:lnRef>
+          <a:fillRef idx="2">
+            <a:schemeClr val="accent2"/>
+          </a:fillRef>
+          <a:effectRef idx="1">
+            <a:schemeClr val="accent2"/>
+          </a:effectRef>
+          <a:fontRef idx="minor">
+            <a:schemeClr val="dk1"/>
+          </a:fontRef>
+        </p:style>
+        <p:txBody>
+          <a:bodyPr rtlCol="0" anchor="ctr"/>
+          <a:lstStyle/>
+          <a:p>
+            <a:pPr algn="ctr"/>
+            <a:r>
+              <a:rPr lang="fr-FR" sz="1000" b="1" dirty="0" err="1" smtClean="0"/>
+              <a:t>BlankFilter</a:t>
+            </a:r>
+            <a:endParaRPr lang="en-US" sz="1000" b="1" dirty="0"/>
+          </a:p>
+        </p:txBody>
+      </p:sp>
+      <p:sp>
+        <p:nvSpPr>
+          <p:cNvPr id="38" name="Rectangle à coins arrondis 37"/>
+          <p:cNvSpPr/>
+          <p:nvPr/>
+        </p:nvSpPr>
+        <p:spPr>
+          <a:xfrm>
+            <a:off x="6970712" y="3807023"/>
+            <a:ext cx="1631301" cy="515943"/>
+          </a:xfrm>
+          <a:prstGeom prst="roundRect">
+            <a:avLst/>
+          </a:prstGeom>
+        </p:spPr>
+        <p:style>
+          <a:lnRef idx="1">
+            <a:schemeClr val="accent2"/>
+          </a:lnRef>
+          <a:fillRef idx="2">
+            <a:schemeClr val="accent2"/>
+          </a:fillRef>
+          <a:effectRef idx="1">
+            <a:schemeClr val="accent2"/>
+          </a:effectRef>
+          <a:fontRef idx="minor">
+            <a:schemeClr val="dk1"/>
+          </a:fontRef>
+        </p:style>
+        <p:txBody>
+          <a:bodyPr rtlCol="0" anchor="ctr"/>
+          <a:lstStyle/>
+          <a:p>
+            <a:pPr algn="ctr"/>
+            <a:r>
+              <a:rPr lang="fr-FR" sz="1000" b="1" dirty="0" err="1" smtClean="0"/>
+              <a:t>PercentageRuleFilter</a:t>
+            </a:r>
+            <a:endParaRPr lang="en-US" sz="1000" b="1" dirty="0"/>
+          </a:p>
+        </p:txBody>
+      </p:sp>
+      <p:sp>
+        <p:nvSpPr>
+          <p:cNvPr id="39" name="ZoneTexte 38"/>
+          <p:cNvSpPr txBox="1"/>
+          <p:nvPr/>
+        </p:nvSpPr>
+        <p:spPr>
+          <a:xfrm>
+            <a:off x="440065" y="3448169"/>
+            <a:ext cx="1635958" cy="276999"/>
+          </a:xfrm>
+          <a:prstGeom prst="rect">
+            <a:avLst/>
+          </a:prstGeom>
+          <a:noFill/>
+        </p:spPr>
+        <p:txBody>
+          <a:bodyPr wrap="square" rtlCol="0">
+            <a:spAutoFit/>
+          </a:bodyPr>
+          <a:lstStyle/>
+          <a:p>
+            <a:r>
+              <a:rPr lang="fr-FR" sz="1200" b="1" dirty="0" err="1" smtClean="0"/>
+              <a:t>PreProcessing</a:t>
+            </a:r>
+            <a:endParaRPr lang="en-US" sz="1050" b="1" dirty="0"/>
+          </a:p>
+        </p:txBody>
+      </p:sp>
+      <p:sp>
+        <p:nvSpPr>
+          <p:cNvPr id="40" name="Rectangle à coins arrondis 39"/>
+          <p:cNvSpPr/>
+          <p:nvPr/>
+        </p:nvSpPr>
+        <p:spPr>
+          <a:xfrm>
+            <a:off x="4457113" y="4925253"/>
+            <a:ext cx="1892050" cy="515943"/>
+          </a:xfrm>
+          <a:prstGeom prst="roundRect">
+            <a:avLst/>
+          </a:prstGeom>
+        </p:spPr>
+        <p:style>
+          <a:lnRef idx="1">
+            <a:schemeClr val="accent2"/>
+          </a:lnRef>
+          <a:fillRef idx="2">
+            <a:schemeClr val="accent2"/>
+          </a:fillRef>
+          <a:effectRef idx="1">
+            <a:schemeClr val="accent2"/>
+          </a:effectRef>
+          <a:fontRef idx="minor">
+            <a:schemeClr val="dk1"/>
+          </a:fontRef>
+        </p:style>
+        <p:txBody>
+          <a:bodyPr rtlCol="0" anchor="ctr"/>
+          <a:lstStyle/>
+          <a:p>
+            <a:pPr algn="ctr"/>
+            <a:r>
+              <a:rPr lang="fr-FR" sz="1000" b="1" dirty="0" err="1" smtClean="0"/>
+              <a:t>InterBatchDriftCorrector</a:t>
+            </a:r>
+            <a:endParaRPr lang="en-US" sz="1000" b="1" dirty="0"/>
+          </a:p>
+        </p:txBody>
+      </p:sp>
+      <p:sp>
+        <p:nvSpPr>
+          <p:cNvPr id="41" name="Rectangle à coins arrondis 40"/>
+          <p:cNvSpPr/>
+          <p:nvPr/>
+        </p:nvSpPr>
+        <p:spPr>
+          <a:xfrm>
+            <a:off x="1600481" y="4925262"/>
+            <a:ext cx="1854503" cy="515943"/>
+          </a:xfrm>
+          <a:prstGeom prst="roundRect">
+            <a:avLst/>
+          </a:prstGeom>
+        </p:spPr>
+        <p:style>
+          <a:lnRef idx="1">
+            <a:schemeClr val="accent2"/>
+          </a:lnRef>
+          <a:fillRef idx="2">
+            <a:schemeClr val="accent2"/>
+          </a:fillRef>
+          <a:effectRef idx="1">
+            <a:schemeClr val="accent2"/>
+          </a:effectRef>
+          <a:fontRef idx="minor">
+            <a:schemeClr val="dk1"/>
+          </a:fontRef>
+        </p:style>
+        <p:txBody>
+          <a:bodyPr rtlCol="0" anchor="ctr"/>
+          <a:lstStyle/>
+          <a:p>
+            <a:pPr algn="ctr"/>
+            <a:r>
+              <a:rPr lang="fr-FR" sz="1000" b="1" dirty="0" err="1" smtClean="0"/>
+              <a:t>IntraBatchDriftCorrector</a:t>
+            </a:r>
+            <a:endParaRPr lang="en-US" sz="1000" b="1" dirty="0"/>
+          </a:p>
+        </p:txBody>
+      </p:sp>
+      <p:sp>
+        <p:nvSpPr>
+          <p:cNvPr id="42" name="Rectangle à coins arrondis 41"/>
+          <p:cNvSpPr/>
+          <p:nvPr/>
+        </p:nvSpPr>
+        <p:spPr>
+          <a:xfrm>
+            <a:off x="221386" y="4914385"/>
+            <a:ext cx="926887" cy="515943"/>
+          </a:xfrm>
+          <a:prstGeom prst="roundRect">
+            <a:avLst/>
+          </a:prstGeom>
+        </p:spPr>
+        <p:style>
+          <a:lnRef idx="1">
+            <a:schemeClr val="accent2"/>
+          </a:lnRef>
+          <a:fillRef idx="2">
+            <a:schemeClr val="accent2"/>
+          </a:fillRef>
+          <a:effectRef idx="1">
+            <a:schemeClr val="accent2"/>
+          </a:effectRef>
+          <a:fontRef idx="minor">
+            <a:schemeClr val="dk1"/>
+          </a:fontRef>
+        </p:style>
+        <p:txBody>
+          <a:bodyPr rtlCol="0" anchor="ctr"/>
+          <a:lstStyle/>
+          <a:p>
+            <a:pPr algn="ctr"/>
+            <a:r>
+              <a:rPr lang="fr-FR" sz="1000" b="1" dirty="0" err="1" smtClean="0"/>
+              <a:t>QcCV</a:t>
+            </a:r>
+            <a:endParaRPr lang="en-US" sz="1000" b="1" dirty="0"/>
+          </a:p>
+        </p:txBody>
+      </p:sp>
+      <p:sp>
+        <p:nvSpPr>
+          <p:cNvPr id="43" name="Rectangle à coins arrondis 42"/>
+          <p:cNvSpPr/>
+          <p:nvPr/>
+        </p:nvSpPr>
+        <p:spPr>
+          <a:xfrm>
+            <a:off x="7111091" y="4925261"/>
+            <a:ext cx="1405217" cy="515943"/>
+          </a:xfrm>
+          <a:prstGeom prst="roundRect">
+            <a:avLst/>
+          </a:prstGeom>
+        </p:spPr>
+        <p:style>
+          <a:lnRef idx="1">
+            <a:schemeClr val="accent2"/>
+          </a:lnRef>
+          <a:fillRef idx="2">
+            <a:schemeClr val="accent2"/>
+          </a:fillRef>
+          <a:effectRef idx="1">
+            <a:schemeClr val="accent2"/>
+          </a:effectRef>
+          <a:fontRef idx="minor">
+            <a:schemeClr val="dk1"/>
+          </a:fontRef>
+        </p:style>
+        <p:txBody>
+          <a:bodyPr rtlCol="0" anchor="ctr"/>
+          <a:lstStyle/>
+          <a:p>
+            <a:pPr algn="ctr"/>
+            <a:r>
+              <a:rPr lang="fr-FR" sz="1000" b="1" dirty="0" err="1" smtClean="0"/>
+              <a:t>NegPosMerging</a:t>
+            </a:r>
+            <a:endParaRPr lang="en-US" sz="1000" b="1" dirty="0"/>
+          </a:p>
+        </p:txBody>
+      </p:sp>
+      <p:cxnSp>
+        <p:nvCxnSpPr>
+          <p:cNvPr id="44" name="Connecteur droit avec flèche 43"/>
+          <p:cNvCxnSpPr/>
+          <p:nvPr/>
+        </p:nvCxnSpPr>
+        <p:spPr>
+          <a:xfrm flipV="1">
+            <a:off x="1222465" y="4156505"/>
+            <a:ext cx="370755" cy="6"/>
+          </a:xfrm>
+          <a:prstGeom prst="straightConnector1">
+            <a:avLst/>
+          </a:prstGeom>
+          <a:ln>
+            <a:tailEnd type="arrow"/>
+          </a:ln>
+        </p:spPr>
+        <p:style>
+          <a:lnRef idx="2">
+            <a:schemeClr val="accent1"/>
+          </a:lnRef>
+          <a:fillRef idx="0">
+            <a:schemeClr val="accent1"/>
+          </a:fillRef>
+          <a:effectRef idx="1">
+            <a:schemeClr val="accent1"/>
+          </a:effectRef>
+          <a:fontRef idx="minor">
+            <a:schemeClr val="tx1"/>
+          </a:fontRef>
+        </p:style>
+      </p:cxnSp>
+      <p:cxnSp>
+        <p:nvCxnSpPr>
+          <p:cNvPr id="45" name="Connecteur en angle 44"/>
+          <p:cNvCxnSpPr>
+            <a:endCxn id="42" idx="0"/>
+          </p:cNvCxnSpPr>
+          <p:nvPr/>
+        </p:nvCxnSpPr>
+        <p:spPr>
+          <a:xfrm rot="10800000" flipV="1">
+            <a:off x="684831" y="4514707"/>
+            <a:ext cx="7241911" cy="399678"/>
+          </a:xfrm>
+          <a:prstGeom prst="bentConnector2">
+            <a:avLst/>
+          </a:prstGeom>
+          <a:ln>
+            <a:tailEnd type="arrow"/>
+          </a:ln>
+        </p:spPr>
+        <p:style>
+          <a:lnRef idx="2">
+            <a:schemeClr val="accent1"/>
+          </a:lnRef>
+          <a:fillRef idx="0">
+            <a:schemeClr val="accent1"/>
+          </a:fillRef>
+          <a:effectRef idx="1">
+            <a:schemeClr val="accent1"/>
+          </a:effectRef>
+          <a:fontRef idx="minor">
+            <a:schemeClr val="tx1"/>
+          </a:fontRef>
+        </p:style>
+      </p:cxnSp>
+      <p:cxnSp>
+        <p:nvCxnSpPr>
+          <p:cNvPr id="46" name="Connecteur droit avec flèche 45"/>
+          <p:cNvCxnSpPr/>
+          <p:nvPr/>
+        </p:nvCxnSpPr>
+        <p:spPr>
+          <a:xfrm flipV="1">
+            <a:off x="2907901" y="4156511"/>
+            <a:ext cx="370755" cy="6"/>
+          </a:xfrm>
+          <a:prstGeom prst="straightConnector1">
+            <a:avLst/>
+          </a:prstGeom>
+          <a:ln>
+            <a:tailEnd type="arrow"/>
+          </a:ln>
+        </p:spPr>
+        <p:style>
+          <a:lnRef idx="2">
+            <a:schemeClr val="accent1"/>
+          </a:lnRef>
+          <a:fillRef idx="0">
+            <a:schemeClr val="accent1"/>
+          </a:fillRef>
+          <a:effectRef idx="1">
+            <a:schemeClr val="accent1"/>
+          </a:effectRef>
+          <a:fontRef idx="minor">
+            <a:schemeClr val="tx1"/>
+          </a:fontRef>
+        </p:style>
+      </p:cxnSp>
+      <p:cxnSp>
+        <p:nvCxnSpPr>
+          <p:cNvPr id="47" name="Connecteur droit avec flèche 46"/>
+          <p:cNvCxnSpPr/>
+          <p:nvPr/>
+        </p:nvCxnSpPr>
+        <p:spPr>
+          <a:xfrm flipV="1">
+            <a:off x="4895386" y="4180048"/>
+            <a:ext cx="370755" cy="6"/>
+          </a:xfrm>
+          <a:prstGeom prst="straightConnector1">
+            <a:avLst/>
+          </a:prstGeom>
+          <a:ln>
+            <a:tailEnd type="arrow"/>
+          </a:ln>
+        </p:spPr>
+        <p:style>
+          <a:lnRef idx="2">
+            <a:schemeClr val="accent1"/>
+          </a:lnRef>
+          <a:fillRef idx="0">
+            <a:schemeClr val="accent1"/>
+          </a:fillRef>
+          <a:effectRef idx="1">
+            <a:schemeClr val="accent1"/>
+          </a:effectRef>
+          <a:fontRef idx="minor">
+            <a:schemeClr val="tx1"/>
+          </a:fontRef>
+        </p:style>
+      </p:cxnSp>
+      <p:cxnSp>
+        <p:nvCxnSpPr>
+          <p:cNvPr id="48" name="Connecteur droit avec flèche 47"/>
+          <p:cNvCxnSpPr/>
+          <p:nvPr/>
+        </p:nvCxnSpPr>
+        <p:spPr>
+          <a:xfrm flipV="1">
+            <a:off x="6574079" y="4134293"/>
+            <a:ext cx="370755" cy="6"/>
+          </a:xfrm>
+          <a:prstGeom prst="straightConnector1">
+            <a:avLst/>
+          </a:prstGeom>
+          <a:ln>
+            <a:tailEnd type="arrow"/>
+          </a:ln>
+        </p:spPr>
+        <p:style>
+          <a:lnRef idx="2">
+            <a:schemeClr val="accent1"/>
+          </a:lnRef>
+          <a:fillRef idx="0">
+            <a:schemeClr val="accent1"/>
+          </a:fillRef>
+          <a:effectRef idx="1">
+            <a:schemeClr val="accent1"/>
+          </a:effectRef>
+          <a:fontRef idx="minor">
+            <a:schemeClr val="tx1"/>
+          </a:fontRef>
+        </p:style>
+      </p:cxnSp>
+      <p:cxnSp>
+        <p:nvCxnSpPr>
+          <p:cNvPr id="49" name="Connecteur droit avec flèche 48"/>
+          <p:cNvCxnSpPr/>
+          <p:nvPr/>
+        </p:nvCxnSpPr>
+        <p:spPr>
+          <a:xfrm flipV="1">
+            <a:off x="1248198" y="5305650"/>
+            <a:ext cx="370755" cy="6"/>
+          </a:xfrm>
+          <a:prstGeom prst="straightConnector1">
+            <a:avLst/>
+          </a:prstGeom>
+          <a:ln>
+            <a:tailEnd type="arrow"/>
+          </a:ln>
+        </p:spPr>
+        <p:style>
+          <a:lnRef idx="2">
+            <a:schemeClr val="accent1"/>
+          </a:lnRef>
+          <a:fillRef idx="0">
+            <a:schemeClr val="accent1"/>
+          </a:fillRef>
+          <a:effectRef idx="1">
+            <a:schemeClr val="accent1"/>
+          </a:effectRef>
+          <a:fontRef idx="minor">
+            <a:schemeClr val="tx1"/>
+          </a:fontRef>
+        </p:style>
+      </p:cxnSp>
+      <p:cxnSp>
+        <p:nvCxnSpPr>
+          <p:cNvPr id="50" name="Connecteur droit avec flèche 49"/>
+          <p:cNvCxnSpPr/>
+          <p:nvPr/>
+        </p:nvCxnSpPr>
+        <p:spPr>
+          <a:xfrm flipV="1">
+            <a:off x="3764959" y="5183218"/>
+            <a:ext cx="370755" cy="6"/>
+          </a:xfrm>
+          <a:prstGeom prst="straightConnector1">
+            <a:avLst/>
+          </a:prstGeom>
+          <a:ln>
+            <a:tailEnd type="arrow"/>
+          </a:ln>
+        </p:spPr>
+        <p:style>
+          <a:lnRef idx="2">
+            <a:schemeClr val="accent1"/>
+          </a:lnRef>
+          <a:fillRef idx="0">
+            <a:schemeClr val="accent1"/>
+          </a:fillRef>
+          <a:effectRef idx="1">
+            <a:schemeClr val="accent1"/>
+          </a:effectRef>
+          <a:fontRef idx="minor">
+            <a:schemeClr val="tx1"/>
+          </a:fontRef>
+        </p:style>
+      </p:cxnSp>
+      <p:cxnSp>
+        <p:nvCxnSpPr>
+          <p:cNvPr id="51" name="Connecteur droit avec flèche 50"/>
+          <p:cNvCxnSpPr/>
+          <p:nvPr/>
+        </p:nvCxnSpPr>
+        <p:spPr>
+          <a:xfrm flipV="1">
+            <a:off x="6634838" y="5183225"/>
+            <a:ext cx="370755" cy="6"/>
+          </a:xfrm>
+          <a:prstGeom prst="straightConnector1">
+            <a:avLst/>
+          </a:prstGeom>
+          <a:ln>
+            <a:tailEnd type="arrow"/>
+          </a:ln>
+        </p:spPr>
+        <p:style>
+          <a:lnRef idx="2">
+            <a:schemeClr val="accent1"/>
+          </a:lnRef>
+          <a:fillRef idx="0">
+            <a:schemeClr val="accent1"/>
+          </a:fillRef>
+          <a:effectRef idx="1">
+            <a:schemeClr val="accent1"/>
+          </a:effectRef>
+          <a:fontRef idx="minor">
+            <a:schemeClr val="tx1"/>
+          </a:fontRef>
+        </p:style>
+      </p:cxnSp>
+      <p:sp>
+        <p:nvSpPr>
+          <p:cNvPr id="95" name="Rectangle à coins arrondis 94"/>
+          <p:cNvSpPr/>
+          <p:nvPr/>
+        </p:nvSpPr>
+        <p:spPr>
+          <a:xfrm>
+            <a:off x="312263" y="5927456"/>
+            <a:ext cx="1839962" cy="833652"/>
+          </a:xfrm>
+          <a:prstGeom prst="roundRect">
+            <a:avLst/>
+          </a:prstGeom>
+        </p:spPr>
+        <p:style>
+          <a:lnRef idx="2">
+            <a:schemeClr val="accent3">
+              <a:shade val="50000"/>
+            </a:schemeClr>
+          </a:lnRef>
+          <a:fillRef idx="1">
+            <a:schemeClr val="accent3"/>
+          </a:fillRef>
+          <a:effectRef idx="0">
+            <a:schemeClr val="accent3"/>
+          </a:effectRef>
+          <a:fontRef idx="minor">
+            <a:schemeClr val="lt1"/>
+          </a:fontRef>
+        </p:style>
+        <p:txBody>
+          <a:bodyPr rtlCol="0" anchor="ctr"/>
+          <a:lstStyle/>
+          <a:p>
+            <a:pPr algn="ctr"/>
+            <a:endParaRPr lang="en-US" sz="1100" b="1" dirty="0">
+              <a:latin typeface="+mj-lt"/>
+            </a:endParaRPr>
+          </a:p>
+        </p:txBody>
+      </p:sp>
+      <p:sp>
+        <p:nvSpPr>
+          <p:cNvPr id="96" name="Rectangle à coins arrondis 95"/>
+          <p:cNvSpPr/>
+          <p:nvPr/>
+        </p:nvSpPr>
+        <p:spPr>
+          <a:xfrm>
+            <a:off x="629104" y="6078628"/>
+            <a:ext cx="1148018" cy="531307"/>
+          </a:xfrm>
+          <a:prstGeom prst="roundRect">
+            <a:avLst/>
+          </a:prstGeom>
+        </p:spPr>
+        <p:style>
+          <a:lnRef idx="1">
+            <a:schemeClr val="accent3"/>
+          </a:lnRef>
+          <a:fillRef idx="2">
+            <a:schemeClr val="accent3"/>
+          </a:fillRef>
+          <a:effectRef idx="1">
+            <a:schemeClr val="accent3"/>
+          </a:effectRef>
+          <a:fontRef idx="minor">
+            <a:schemeClr val="dk1"/>
+          </a:fontRef>
+        </p:style>
+        <p:txBody>
+          <a:bodyPr rtlCol="0" anchor="ctr"/>
+          <a:lstStyle/>
+          <a:p>
+            <a:pPr algn="ctr"/>
+            <a:r>
+              <a:rPr lang="fr-FR" sz="1000" dirty="0" err="1" smtClean="0">
+                <a:latin typeface="Arial Black" panose="020B0A04020102020204" pitchFamily="34" charset="0"/>
+              </a:rPr>
+              <a:t>LipidMatch</a:t>
+            </a:r>
+            <a:endParaRPr lang="en-US" sz="1050" dirty="0">
+              <a:latin typeface="Arial Black" panose="020B0A04020102020204" pitchFamily="34" charset="0"/>
+            </a:endParaRPr>
+          </a:p>
+        </p:txBody>
+      </p:sp>
+      <p:sp>
+        <p:nvSpPr>
+          <p:cNvPr id="97" name="ZoneTexte 96"/>
+          <p:cNvSpPr txBox="1"/>
+          <p:nvPr/>
+        </p:nvSpPr>
+        <p:spPr>
+          <a:xfrm>
+            <a:off x="333819" y="5669804"/>
+            <a:ext cx="3200400" cy="261610"/>
+          </a:xfrm>
+          <a:prstGeom prst="rect">
+            <a:avLst/>
+          </a:prstGeom>
+          <a:noFill/>
+        </p:spPr>
+        <p:txBody>
+          <a:bodyPr wrap="square" rtlCol="0">
+            <a:spAutoFit/>
+          </a:bodyPr>
+          <a:lstStyle/>
+          <a:p>
+            <a:r>
+              <a:rPr lang="fr-FR" sz="1050" b="1" dirty="0" smtClean="0">
+                <a:latin typeface="Arial Black" panose="020B0A04020102020204" pitchFamily="34" charset="0"/>
+              </a:rPr>
+              <a:t>Identification</a:t>
+            </a:r>
+            <a:endParaRPr lang="en-US" sz="1050" b="1" dirty="0">
+              <a:latin typeface="Arial Black" panose="020B0A04020102020204" pitchFamily="34" charset="0"/>
+            </a:endParaRPr>
+          </a:p>
+        </p:txBody>
+      </p:sp>
+      <p:sp>
+        <p:nvSpPr>
+          <p:cNvPr id="98" name="Rectangle à coins arrondis 97"/>
+          <p:cNvSpPr/>
+          <p:nvPr/>
+        </p:nvSpPr>
+        <p:spPr>
+          <a:xfrm>
+            <a:off x="645709" y="6213477"/>
+            <a:ext cx="1131413" cy="261610"/>
+          </a:xfrm>
+          <a:prstGeom prst="roundRect">
+            <a:avLst/>
+          </a:prstGeom>
+        </p:spPr>
+        <p:style>
+          <a:lnRef idx="2">
+            <a:schemeClr val="accent1">
+              <a:shade val="50000"/>
+            </a:schemeClr>
+          </a:lnRef>
+          <a:fillRef idx="1">
+            <a:schemeClr val="accent1"/>
+          </a:fillRef>
+          <a:effectRef idx="0">
+            <a:schemeClr val="accent1"/>
+          </a:effectRef>
+          <a:fontRef idx="minor">
+            <a:schemeClr val="lt1"/>
+          </a:fontRef>
+        </p:style>
+        <p:txBody>
+          <a:bodyPr rtlCol="0" anchor="ctr"/>
+          <a:lstStyle/>
+          <a:p>
+            <a:pPr algn="ctr"/>
+            <a:r>
+              <a:rPr lang="fr-FR" sz="1400" dirty="0" err="1" smtClean="0"/>
+              <a:t>PushButton</a:t>
+            </a:r>
+            <a:endParaRPr lang="en-US" sz="1400" dirty="0"/>
+          </a:p>
+        </p:txBody>
+      </p:sp>
+    </p:spTree>
+    <p:extLst>
+      <p:ext uri="{BB962C8B-B14F-4D97-AF65-F5344CB8AC3E}">
+        <p14:creationId xmlns:p14="http://schemas.microsoft.com/office/powerpoint/2010/main" val="1169414929"/>
+      </p:ext>
+    </p:extLst>
+  </p:cSld>
+  <p:clrMapOvr>
+    <a:masterClrMapping/>
+  </p:clrMapOvr>
+</p:sld>
+</file>
+
+<file path=ppt/slides/slide6.xml><?xml version="1.0" encoding="utf-8"?>
+<p:sld xmlns:a="http://schemas.openxmlformats.org/drawingml/2006/main" xmlns:r="http://schemas.openxmlformats.org/officeDocument/2006/relationships" xmlns:p="http://schemas.openxmlformats.org/presentationml/2006/main">
+  <p:cSld>
+    <p:spTree>
+      <p:nvGrpSpPr>
+        <p:cNvPr id="1" name=""/>
+        <p:cNvGrpSpPr/>
+        <p:nvPr/>
+      </p:nvGrpSpPr>
+      <p:grpSpPr>
+        <a:xfrm>
+          <a:off x="0" y="0"/>
+          <a:ext cx="0" cy="0"/>
+          <a:chOff x="0" y="0"/>
+          <a:chExt cx="0" cy="0"/>
+        </a:xfrm>
+      </p:grpSpPr>
+    </p:spTree>
+    <p:extLst>
+      <p:ext uri="{BB962C8B-B14F-4D97-AF65-F5344CB8AC3E}">
+        <p14:creationId xmlns:p14="http://schemas.microsoft.com/office/powerpoint/2010/main" val="3229927377"/>
       </p:ext>
     </p:extLst>
   </p:cSld>

</xml_diff>